<commit_message>
add Visual Studio Code demo page
</commit_message>
<xml_diff>
--- a/Git.pptx
+++ b/Git.pptx
@@ -22,7 +22,8 @@
     <p:sldId id="268" r:id="rId16"/>
     <p:sldId id="271" r:id="rId17"/>
     <p:sldId id="272" r:id="rId18"/>
-    <p:sldId id="273" r:id="rId19"/>
+    <p:sldId id="274" r:id="rId19"/>
+    <p:sldId id="273" r:id="rId20"/>
   </p:sldIdLst>
   <p:sldSz cx="12192000" cy="6858000"/>
   <p:notesSz cx="6858000" cy="9144000"/>
@@ -8926,7 +8927,7 @@
           <a:p>
             <a:fld id="{0C30123F-F125-42B8-BD0C-192B27A632AA}" type="datetimeFigureOut">
               <a:rPr lang="zh-TW" altLang="en-US" smtClean="0"/>
-              <a:t>2018/1/19</a:t>
+              <a:t>2018/1/20</a:t>
             </a:fld>
             <a:endParaRPr lang="zh-TW" altLang="en-US"/>
           </a:p>
@@ -9133,7 +9134,7 @@
           <a:p>
             <a:fld id="{0C30123F-F125-42B8-BD0C-192B27A632AA}" type="datetimeFigureOut">
               <a:rPr lang="zh-TW" altLang="en-US" smtClean="0"/>
-              <a:t>2018/1/19</a:t>
+              <a:t>2018/1/20</a:t>
             </a:fld>
             <a:endParaRPr lang="zh-TW" altLang="en-US"/>
           </a:p>
@@ -9313,7 +9314,7 @@
           <a:p>
             <a:fld id="{0C30123F-F125-42B8-BD0C-192B27A632AA}" type="datetimeFigureOut">
               <a:rPr lang="zh-TW" altLang="en-US" smtClean="0"/>
-              <a:t>2018/1/19</a:t>
+              <a:t>2018/1/20</a:t>
             </a:fld>
             <a:endParaRPr lang="zh-TW" altLang="en-US"/>
           </a:p>
@@ -9518,7 +9519,7 @@
           <a:p>
             <a:fld id="{0C30123F-F125-42B8-BD0C-192B27A632AA}" type="datetimeFigureOut">
               <a:rPr lang="zh-TW" altLang="en-US" smtClean="0"/>
-              <a:t>2018/1/19</a:t>
+              <a:t>2018/1/20</a:t>
             </a:fld>
             <a:endParaRPr lang="zh-TW" altLang="en-US"/>
           </a:p>
@@ -18416,7 +18417,7 @@
           <a:p>
             <a:fld id="{0C30123F-F125-42B8-BD0C-192B27A632AA}" type="datetimeFigureOut">
               <a:rPr lang="zh-TW" altLang="en-US" smtClean="0"/>
-              <a:t>2018/1/19</a:t>
+              <a:t>2018/1/20</a:t>
             </a:fld>
             <a:endParaRPr lang="zh-TW" altLang="en-US"/>
           </a:p>
@@ -18690,7 +18691,7 @@
           <a:p>
             <a:fld id="{0C30123F-F125-42B8-BD0C-192B27A632AA}" type="datetimeFigureOut">
               <a:rPr lang="zh-TW" altLang="en-US" smtClean="0"/>
-              <a:t>2018/1/19</a:t>
+              <a:t>2018/1/20</a:t>
             </a:fld>
             <a:endParaRPr lang="zh-TW" altLang="en-US"/>
           </a:p>
@@ -19088,7 +19089,7 @@
           <a:p>
             <a:fld id="{0C30123F-F125-42B8-BD0C-192B27A632AA}" type="datetimeFigureOut">
               <a:rPr lang="zh-TW" altLang="en-US" smtClean="0"/>
-              <a:t>2018/1/19</a:t>
+              <a:t>2018/1/20</a:t>
             </a:fld>
             <a:endParaRPr lang="zh-TW" altLang="en-US"/>
           </a:p>
@@ -19206,7 +19207,7 @@
           <a:p>
             <a:fld id="{0C30123F-F125-42B8-BD0C-192B27A632AA}" type="datetimeFigureOut">
               <a:rPr lang="zh-TW" altLang="en-US" smtClean="0"/>
-              <a:t>2018/1/19</a:t>
+              <a:t>2018/1/20</a:t>
             </a:fld>
             <a:endParaRPr lang="zh-TW" altLang="en-US"/>
           </a:p>
@@ -19301,7 +19302,7 @@
           <a:p>
             <a:fld id="{0C30123F-F125-42B8-BD0C-192B27A632AA}" type="datetimeFigureOut">
               <a:rPr lang="zh-TW" altLang="en-US" smtClean="0"/>
-              <a:t>2018/1/19</a:t>
+              <a:t>2018/1/20</a:t>
             </a:fld>
             <a:endParaRPr lang="zh-TW" altLang="en-US"/>
           </a:p>
@@ -19591,7 +19592,7 @@
           <a:p>
             <a:fld id="{0C30123F-F125-42B8-BD0C-192B27A632AA}" type="datetimeFigureOut">
               <a:rPr lang="zh-TW" altLang="en-US" smtClean="0"/>
-              <a:t>2018/1/19</a:t>
+              <a:t>2018/1/20</a:t>
             </a:fld>
             <a:endParaRPr lang="zh-TW" altLang="en-US"/>
           </a:p>
@@ -19871,7 +19872,7 @@
           <a:p>
             <a:fld id="{0C30123F-F125-42B8-BD0C-192B27A632AA}" type="datetimeFigureOut">
               <a:rPr lang="zh-TW" altLang="en-US" smtClean="0"/>
-              <a:t>2018/1/19</a:t>
+              <a:t>2018/1/20</a:t>
             </a:fld>
             <a:endParaRPr lang="zh-TW" altLang="en-US"/>
           </a:p>
@@ -20121,7 +20122,7 @@
           <a:p>
             <a:fld id="{0C30123F-F125-42B8-BD0C-192B27A632AA}" type="datetimeFigureOut">
               <a:rPr lang="zh-TW" altLang="en-US" smtClean="0"/>
-              <a:t>2018/1/19</a:t>
+              <a:t>2018/1/20</a:t>
             </a:fld>
             <a:endParaRPr lang="zh-TW" altLang="en-US"/>
           </a:p>
@@ -22223,6 +22224,98 @@
       </p:grpSpPr>
       <p:sp>
         <p:nvSpPr>
+          <p:cNvPr id="2" name="標題 1">
+            <a:extLst>
+              <a:ext uri="{FF2B5EF4-FFF2-40B4-BE49-F238E27FC236}">
+                <a16:creationId xmlns:a16="http://schemas.microsoft.com/office/drawing/2014/main" id="{B1F26FBB-A3C2-43CD-86E7-D21E63E2C6B2}"/>
+              </a:ext>
+            </a:extLst>
+          </p:cNvPr>
+          <p:cNvSpPr>
+            <a:spLocks noGrp="1"/>
+          </p:cNvSpPr>
+          <p:nvPr>
+            <p:ph type="title"/>
+          </p:nvPr>
+        </p:nvSpPr>
+        <p:spPr/>
+        <p:txBody>
+          <a:bodyPr/>
+          <a:lstStyle/>
+          <a:p>
+            <a:r>
+              <a:rPr lang="zh-TW" altLang="en-US" dirty="0"/>
+              <a:t>文件編輯工具</a:t>
+            </a:r>
+          </a:p>
+        </p:txBody>
+      </p:sp>
+      <p:sp>
+        <p:nvSpPr>
+          <p:cNvPr id="3" name="內容版面配置區 2">
+            <a:extLst>
+              <a:ext uri="{FF2B5EF4-FFF2-40B4-BE49-F238E27FC236}">
+                <a16:creationId xmlns:a16="http://schemas.microsoft.com/office/drawing/2014/main" id="{3DFB1D16-C33F-4D93-93CC-8A6DCB7B84EE}"/>
+              </a:ext>
+            </a:extLst>
+          </p:cNvPr>
+          <p:cNvSpPr>
+            <a:spLocks noGrp="1"/>
+          </p:cNvSpPr>
+          <p:nvPr>
+            <p:ph idx="1"/>
+          </p:nvPr>
+        </p:nvSpPr>
+        <p:spPr/>
+        <p:txBody>
+          <a:bodyPr/>
+          <a:lstStyle/>
+          <a:p>
+            <a:r>
+              <a:rPr lang="en-US" altLang="zh-TW" dirty="0">
+                <a:latin typeface="+mn-ea"/>
+                <a:hlinkClick r:id="rId2"/>
+              </a:rPr>
+              <a:t>Visual Studio Code</a:t>
+            </a:r>
+            <a:endParaRPr lang="zh-TW" altLang="en-US" dirty="0">
+              <a:latin typeface="+mn-ea"/>
+            </a:endParaRPr>
+          </a:p>
+        </p:txBody>
+      </p:sp>
+    </p:spTree>
+    <p:extLst>
+      <p:ext uri="{BB962C8B-B14F-4D97-AF65-F5344CB8AC3E}">
+        <p14:creationId xmlns:p14="http://schemas.microsoft.com/office/powerpoint/2010/main" val="2237138809"/>
+      </p:ext>
+    </p:extLst>
+  </p:cSld>
+  <p:clrMapOvr>
+    <a:masterClrMapping/>
+  </p:clrMapOvr>
+</p:sld>
+</file>
+
+<file path=ppt/slides/slide19.xml><?xml version="1.0" encoding="utf-8"?>
+<p:sld xmlns:a="http://schemas.openxmlformats.org/drawingml/2006/main" xmlns:r="http://schemas.openxmlformats.org/officeDocument/2006/relationships" xmlns:p="http://schemas.openxmlformats.org/presentationml/2006/main">
+  <p:cSld>
+    <p:spTree>
+      <p:nvGrpSpPr>
+        <p:cNvPr id="1" name=""/>
+        <p:cNvGrpSpPr/>
+        <p:nvPr/>
+      </p:nvGrpSpPr>
+      <p:grpSpPr>
+        <a:xfrm>
+          <a:off x="0" y="0"/>
+          <a:ext cx="0" cy="0"/>
+          <a:chOff x="0" y="0"/>
+          <a:chExt cx="0" cy="0"/>
+        </a:xfrm>
+      </p:grpSpPr>
+      <p:sp>
+        <p:nvSpPr>
           <p:cNvPr id="4" name="標題 3">
             <a:extLst>
               <a:ext uri="{FF2B5EF4-FFF2-40B4-BE49-F238E27FC236}">

</xml_diff>